<commit_message>
Added Linked list Slide
</commit_message>
<xml_diff>
--- a/Documents/Slides/Chapter_1-LinkedList/[1]Estructura de datos-Introduccion.pptx
+++ b/Documents/Slides/Chapter_1-LinkedList/[1]Estructura de datos-Introduccion.pptx
@@ -214,7 +214,7 @@
           <a:p>
             <a:fld id="{370563D5-C4CB-4B55-8034-10BC305BF366}" type="datetimeFigureOut">
               <a:rPr lang="en-US" smtClean="0"/>
-              <a:t>8/2/2021</a:t>
+              <a:t>8/6/2021</a:t>
             </a:fld>
             <a:endParaRPr lang="en-US"/>
           </a:p>
@@ -948,7 +948,7 @@
           <a:p>
             <a:fld id="{3726FBD9-8ACB-4A6F-A97B-791135345E30}" type="datetimeFigureOut">
               <a:rPr lang="en-US" smtClean="0"/>
-              <a:t>8/2/2021</a:t>
+              <a:t>8/6/2021</a:t>
             </a:fld>
             <a:endParaRPr lang="en-US"/>
           </a:p>
@@ -1118,7 +1118,7 @@
           <a:p>
             <a:fld id="{3726FBD9-8ACB-4A6F-A97B-791135345E30}" type="datetimeFigureOut">
               <a:rPr lang="en-US" smtClean="0"/>
-              <a:t>8/2/2021</a:t>
+              <a:t>8/6/2021</a:t>
             </a:fld>
             <a:endParaRPr lang="en-US"/>
           </a:p>
@@ -1298,7 +1298,7 @@
           <a:p>
             <a:fld id="{3726FBD9-8ACB-4A6F-A97B-791135345E30}" type="datetimeFigureOut">
               <a:rPr lang="en-US" smtClean="0"/>
-              <a:t>8/2/2021</a:t>
+              <a:t>8/6/2021</a:t>
             </a:fld>
             <a:endParaRPr lang="en-US"/>
           </a:p>
@@ -1468,7 +1468,7 @@
           <a:p>
             <a:fld id="{3726FBD9-8ACB-4A6F-A97B-791135345E30}" type="datetimeFigureOut">
               <a:rPr lang="en-US" smtClean="0"/>
-              <a:t>8/2/2021</a:t>
+              <a:t>8/6/2021</a:t>
             </a:fld>
             <a:endParaRPr lang="en-US"/>
           </a:p>
@@ -1714,7 +1714,7 @@
           <a:p>
             <a:fld id="{3726FBD9-8ACB-4A6F-A97B-791135345E30}" type="datetimeFigureOut">
               <a:rPr lang="en-US" smtClean="0"/>
-              <a:t>8/2/2021</a:t>
+              <a:t>8/6/2021</a:t>
             </a:fld>
             <a:endParaRPr lang="en-US"/>
           </a:p>
@@ -1946,7 +1946,7 @@
           <a:p>
             <a:fld id="{3726FBD9-8ACB-4A6F-A97B-791135345E30}" type="datetimeFigureOut">
               <a:rPr lang="en-US" smtClean="0"/>
-              <a:t>8/2/2021</a:t>
+              <a:t>8/6/2021</a:t>
             </a:fld>
             <a:endParaRPr lang="en-US"/>
           </a:p>
@@ -2313,7 +2313,7 @@
           <a:p>
             <a:fld id="{3726FBD9-8ACB-4A6F-A97B-791135345E30}" type="datetimeFigureOut">
               <a:rPr lang="en-US" smtClean="0"/>
-              <a:t>8/2/2021</a:t>
+              <a:t>8/6/2021</a:t>
             </a:fld>
             <a:endParaRPr lang="en-US"/>
           </a:p>
@@ -2431,7 +2431,7 @@
           <a:p>
             <a:fld id="{3726FBD9-8ACB-4A6F-A97B-791135345E30}" type="datetimeFigureOut">
               <a:rPr lang="en-US" smtClean="0"/>
-              <a:t>8/2/2021</a:t>
+              <a:t>8/6/2021</a:t>
             </a:fld>
             <a:endParaRPr lang="en-US"/>
           </a:p>
@@ -2526,7 +2526,7 @@
           <a:p>
             <a:fld id="{3726FBD9-8ACB-4A6F-A97B-791135345E30}" type="datetimeFigureOut">
               <a:rPr lang="en-US" smtClean="0"/>
-              <a:t>8/2/2021</a:t>
+              <a:t>8/6/2021</a:t>
             </a:fld>
             <a:endParaRPr lang="en-US"/>
           </a:p>
@@ -2803,7 +2803,7 @@
           <a:p>
             <a:fld id="{3726FBD9-8ACB-4A6F-A97B-791135345E30}" type="datetimeFigureOut">
               <a:rPr lang="en-US" smtClean="0"/>
-              <a:t>8/2/2021</a:t>
+              <a:t>8/6/2021</a:t>
             </a:fld>
             <a:endParaRPr lang="en-US"/>
           </a:p>
@@ -3056,7 +3056,7 @@
           <a:p>
             <a:fld id="{3726FBD9-8ACB-4A6F-A97B-791135345E30}" type="datetimeFigureOut">
               <a:rPr lang="en-US" smtClean="0"/>
-              <a:t>8/2/2021</a:t>
+              <a:t>8/6/2021</a:t>
             </a:fld>
             <a:endParaRPr lang="en-US"/>
           </a:p>
@@ -3269,7 +3269,7 @@
           <a:p>
             <a:fld id="{3726FBD9-8ACB-4A6F-A97B-791135345E30}" type="datetimeFigureOut">
               <a:rPr lang="en-US" smtClean="0"/>
-              <a:t>8/2/2021</a:t>
+              <a:t>8/6/2021</a:t>
             </a:fld>
             <a:endParaRPr lang="en-US"/>
           </a:p>
@@ -3980,6 +3980,13 @@
   <p:clrMapOvr>
     <a:masterClrMapping/>
   </p:clrMapOvr>
+  <p:timing>
+    <p:tnLst>
+      <p:par>
+        <p:cTn id="1" dur="indefinite" restart="never" nodeType="tmRoot"/>
+      </p:par>
+    </p:tnLst>
+  </p:timing>
 </p:sld>
 </file>
 
@@ -4422,13 +4429,6 @@
               </a:rPr>
               <a:t>En serio pretendes mantener 70000 elementos en memoria?</a:t>
             </a:r>
-            <a:endParaRPr lang="es-MX" dirty="0" smtClean="0">
-              <a:solidFill>
-                <a:schemeClr val="lt1"/>
-              </a:solidFill>
-              <a:latin typeface="DengXian" panose="02010600030101010101" pitchFamily="2" charset="-122"/>
-              <a:ea typeface="DengXian" panose="02010600030101010101" pitchFamily="2" charset="-122"/>
-            </a:endParaRPr>
           </a:p>
           <a:p>
             <a:endParaRPr lang="es-MX" dirty="0">
@@ -4765,6 +4765,13 @@
   <p:clrMapOvr>
     <a:masterClrMapping/>
   </p:clrMapOvr>
+  <p:timing>
+    <p:tnLst>
+      <p:par>
+        <p:cTn id="1" dur="indefinite" restart="never" nodeType="tmRoot"/>
+      </p:par>
+    </p:tnLst>
+  </p:timing>
 </p:sld>
 </file>
 

</xml_diff>